<commit_message>
Fixed bugs in case statement emulation slides
</commit_message>
<xml_diff>
--- a/Python as an additional language/Lesson 4/Session 4.pptx
+++ b/Python as an additional language/Lesson 4/Session 4.pptx
@@ -257,7 +257,7 @@
           <a:p>
             <a:fld id="{341A5339-6120-134C-B7F3-8A3A216FC851}" type="datetimeFigureOut">
               <a:rPr lang="en-US" smtClean="0"/>
-              <a:t>10/13/16</a:t>
+              <a:t>6/29/17</a:t>
             </a:fld>
             <a:endParaRPr lang="en-US"/>
           </a:p>
@@ -427,7 +427,7 @@
           <a:p>
             <a:fld id="{341A5339-6120-134C-B7F3-8A3A216FC851}" type="datetimeFigureOut">
               <a:rPr lang="en-US" smtClean="0"/>
-              <a:t>10/13/16</a:t>
+              <a:t>6/29/17</a:t>
             </a:fld>
             <a:endParaRPr lang="en-US"/>
           </a:p>
@@ -607,7 +607,7 @@
           <a:p>
             <a:fld id="{341A5339-6120-134C-B7F3-8A3A216FC851}" type="datetimeFigureOut">
               <a:rPr lang="en-US" smtClean="0"/>
-              <a:t>10/13/16</a:t>
+              <a:t>6/29/17</a:t>
             </a:fld>
             <a:endParaRPr lang="en-US"/>
           </a:p>
@@ -777,7 +777,7 @@
           <a:p>
             <a:fld id="{341A5339-6120-134C-B7F3-8A3A216FC851}" type="datetimeFigureOut">
               <a:rPr lang="en-US" smtClean="0"/>
-              <a:t>10/13/16</a:t>
+              <a:t>6/29/17</a:t>
             </a:fld>
             <a:endParaRPr lang="en-US"/>
           </a:p>
@@ -1023,7 +1023,7 @@
           <a:p>
             <a:fld id="{341A5339-6120-134C-B7F3-8A3A216FC851}" type="datetimeFigureOut">
               <a:rPr lang="en-US" smtClean="0"/>
-              <a:t>10/13/16</a:t>
+              <a:t>6/29/17</a:t>
             </a:fld>
             <a:endParaRPr lang="en-US"/>
           </a:p>
@@ -1255,7 +1255,7 @@
           <a:p>
             <a:fld id="{341A5339-6120-134C-B7F3-8A3A216FC851}" type="datetimeFigureOut">
               <a:rPr lang="en-US" smtClean="0"/>
-              <a:t>10/13/16</a:t>
+              <a:t>6/29/17</a:t>
             </a:fld>
             <a:endParaRPr lang="en-US"/>
           </a:p>
@@ -1622,7 +1622,7 @@
           <a:p>
             <a:fld id="{341A5339-6120-134C-B7F3-8A3A216FC851}" type="datetimeFigureOut">
               <a:rPr lang="en-US" smtClean="0"/>
-              <a:t>10/13/16</a:t>
+              <a:t>6/29/17</a:t>
             </a:fld>
             <a:endParaRPr lang="en-US"/>
           </a:p>
@@ -1740,7 +1740,7 @@
           <a:p>
             <a:fld id="{341A5339-6120-134C-B7F3-8A3A216FC851}" type="datetimeFigureOut">
               <a:rPr lang="en-US" smtClean="0"/>
-              <a:t>10/13/16</a:t>
+              <a:t>6/29/17</a:t>
             </a:fld>
             <a:endParaRPr lang="en-US"/>
           </a:p>
@@ -1835,7 +1835,7 @@
           <a:p>
             <a:fld id="{341A5339-6120-134C-B7F3-8A3A216FC851}" type="datetimeFigureOut">
               <a:rPr lang="en-US" smtClean="0"/>
-              <a:t>10/13/16</a:t>
+              <a:t>6/29/17</a:t>
             </a:fld>
             <a:endParaRPr lang="en-US"/>
           </a:p>
@@ -2112,7 +2112,7 @@
           <a:p>
             <a:fld id="{341A5339-6120-134C-B7F3-8A3A216FC851}" type="datetimeFigureOut">
               <a:rPr lang="en-US" smtClean="0"/>
-              <a:t>10/13/16</a:t>
+              <a:t>6/29/17</a:t>
             </a:fld>
             <a:endParaRPr lang="en-US"/>
           </a:p>
@@ -2365,7 +2365,7 @@
           <a:p>
             <a:fld id="{341A5339-6120-134C-B7F3-8A3A216FC851}" type="datetimeFigureOut">
               <a:rPr lang="en-US" smtClean="0"/>
-              <a:t>10/13/16</a:t>
+              <a:t>6/29/17</a:t>
             </a:fld>
             <a:endParaRPr lang="en-US"/>
           </a:p>
@@ -2578,7 +2578,7 @@
           <a:p>
             <a:fld id="{341A5339-6120-134C-B7F3-8A3A216FC851}" type="datetimeFigureOut">
               <a:rPr lang="en-US" smtClean="0"/>
-              <a:t>10/13/16</a:t>
+              <a:t>6/29/17</a:t>
             </a:fld>
             <a:endParaRPr lang="en-US"/>
           </a:p>
@@ -3094,11 +3094,7 @@
           <a:p>
             <a:r>
               <a:rPr lang="en-US" sz="4000" dirty="0" smtClean="0"/>
-              <a:t>Python as an Additional </a:t>
-            </a:r>
-            <a:r>
-              <a:rPr lang="en-US" sz="4000" dirty="0" smtClean="0"/>
-              <a:t>Language</a:t>
+              <a:t>Python as an Additional Language</a:t>
             </a:r>
             <a:endParaRPr lang="en-US" sz="4000" dirty="0"/>
           </a:p>
@@ -3837,7 +3833,7 @@
       </p:sp>
       <p:pic>
         <p:nvPicPr>
-          <p:cNvPr id="12" name="Content Placeholder 11"/>
+          <p:cNvPr id="4" name="Content Placeholder 3"/>
           <p:cNvPicPr>
             <a:picLocks noGrp="1" noChangeAspect="1"/>
           </p:cNvPicPr>
@@ -3859,8 +3855,8 @@
         </p:blipFill>
         <p:spPr>
           <a:xfrm>
-            <a:off x="838200" y="1567722"/>
-            <a:ext cx="10515600" cy="2667000"/>
+            <a:off x="1307374" y="1606298"/>
+            <a:ext cx="9577251" cy="2816339"/>
           </a:xfrm>
         </p:spPr>
       </p:pic>
@@ -3934,7 +3930,7 @@
         <p:spPr>
           <a:xfrm>
             <a:off x="3293308" y="5400769"/>
-            <a:ext cx="5605381" cy="369332"/>
+            <a:ext cx="5703806" cy="369332"/>
           </a:xfrm>
           <a:prstGeom prst="rect">
             <a:avLst/>
@@ -3948,43 +3944,13 @@
           <a:lstStyle/>
           <a:p>
             <a:r>
-              <a:rPr lang="en-US" dirty="0" smtClean="0"/>
+              <a:rPr lang="en-US" b="1" dirty="0" smtClean="0"/>
               <a:t>There’s more than enough evil in the world. Don’t do this.</a:t>
             </a:r>
-            <a:endParaRPr lang="en-US" dirty="0"/>
-          </a:p>
-        </p:txBody>
-      </p:sp>
-      <p:pic>
-        <p:nvPicPr>
-          <p:cNvPr id="3" name="Picture 2"/>
-          <p:cNvPicPr>
-            <a:picLocks noChangeAspect="1"/>
-          </p:cNvPicPr>
-          <p:nvPr/>
-        </p:nvPicPr>
-        <p:blipFill>
-          <a:blip r:embed="rId2">
-            <a:extLst>
-              <a:ext uri="{28A0092B-C50C-407E-A947-70E740481C1C}">
-                <a14:useLocalDpi xmlns:a14="http://schemas.microsoft.com/office/drawing/2010/main" val="0"/>
-              </a:ext>
-            </a:extLst>
-          </a:blip>
-          <a:stretch>
-            <a:fillRect/>
-          </a:stretch>
-        </p:blipFill>
-        <p:spPr>
-          <a:xfrm>
-            <a:off x="522512" y="1504579"/>
-            <a:ext cx="11146971" cy="3543337"/>
-          </a:xfrm>
-          <a:prstGeom prst="rect">
-            <a:avLst/>
-          </a:prstGeom>
-        </p:spPr>
-      </p:pic>
+            <a:endParaRPr lang="en-US" b="1" dirty="0"/>
+          </a:p>
+        </p:txBody>
+      </p:sp>
       <p:pic>
         <p:nvPicPr>
           <p:cNvPr id="7" name="Picture 6"/>
@@ -3994,7 +3960,7 @@
           <p:nvPr/>
         </p:nvPicPr>
         <p:blipFill>
-          <a:blip r:embed="rId3">
+          <a:blip r:embed="rId2">
             <a:extLst>
               <a:ext uri="{28A0092B-C50C-407E-A947-70E740481C1C}">
                 <a14:useLocalDpi xmlns:a14="http://schemas.microsoft.com/office/drawing/2010/main" val="0"/>
@@ -4015,6 +3981,114 @@
           </a:prstGeom>
         </p:spPr>
       </p:pic>
+      <p:sp>
+        <p:nvSpPr>
+          <p:cNvPr id="5" name="TextBox 4"/>
+          <p:cNvSpPr txBox="1"/>
+          <p:nvPr/>
+        </p:nvSpPr>
+        <p:spPr>
+          <a:xfrm>
+            <a:off x="622661" y="4624575"/>
+            <a:ext cx="6555641" cy="646331"/>
+          </a:xfrm>
+          <a:prstGeom prst="rect">
+            <a:avLst/>
+          </a:prstGeom>
+          <a:noFill/>
+        </p:spPr>
+        <p:txBody>
+          <a:bodyPr wrap="none" rtlCol="0">
+            <a:spAutoFit/>
+          </a:bodyPr>
+          <a:lstStyle/>
+          <a:p>
+            <a:pPr marL="285750" indent="-285750">
+              <a:buFont typeface="Arial" charset="0"/>
+              <a:buChar char="•"/>
+            </a:pPr>
+            <a:r>
+              <a:rPr lang="en-US" dirty="0" smtClean="0"/>
+              <a:t>We only need to use lambda if we’re supplying an argument</a:t>
+            </a:r>
+          </a:p>
+          <a:p>
+            <a:pPr marL="285750" indent="-285750">
+              <a:buFont typeface="Arial" charset="0"/>
+              <a:buChar char="•"/>
+            </a:pPr>
+            <a:r>
+              <a:rPr lang="en-US" dirty="0" smtClean="0"/>
+              <a:t>We can supply bare function names as references in other places</a:t>
+            </a:r>
+            <a:endParaRPr lang="en-US" dirty="0"/>
+          </a:p>
+        </p:txBody>
+      </p:sp>
+      <p:pic>
+        <p:nvPicPr>
+          <p:cNvPr id="12" name="Picture 11"/>
+          <p:cNvPicPr>
+            <a:picLocks noChangeAspect="1"/>
+          </p:cNvPicPr>
+          <p:nvPr/>
+        </p:nvPicPr>
+        <p:blipFill>
+          <a:blip r:embed="rId3">
+            <a:extLst>
+              <a:ext uri="{28A0092B-C50C-407E-A947-70E740481C1C}">
+                <a14:useLocalDpi xmlns:a14="http://schemas.microsoft.com/office/drawing/2010/main" val="0"/>
+              </a:ext>
+            </a:extLst>
+          </a:blip>
+          <a:stretch>
+            <a:fillRect/>
+          </a:stretch>
+        </p:blipFill>
+        <p:spPr>
+          <a:xfrm>
+            <a:off x="962297" y="1690688"/>
+            <a:ext cx="10267406" cy="2380567"/>
+          </a:xfrm>
+          <a:prstGeom prst="rect">
+            <a:avLst/>
+          </a:prstGeom>
+        </p:spPr>
+      </p:pic>
+      <p:sp>
+        <p:nvSpPr>
+          <p:cNvPr id="13" name="TextBox 12"/>
+          <p:cNvSpPr txBox="1"/>
+          <p:nvPr/>
+        </p:nvSpPr>
+        <p:spPr>
+          <a:xfrm>
+            <a:off x="622661" y="4201118"/>
+            <a:ext cx="4003917" cy="369332"/>
+          </a:xfrm>
+          <a:prstGeom prst="rect">
+            <a:avLst/>
+          </a:prstGeom>
+          <a:noFill/>
+        </p:spPr>
+        <p:txBody>
+          <a:bodyPr wrap="none" rtlCol="0">
+            <a:spAutoFit/>
+          </a:bodyPr>
+          <a:lstStyle/>
+          <a:p>
+            <a:r>
+              <a:rPr lang="en-US" dirty="0" smtClean="0"/>
+              <a:t>This does </a:t>
+            </a:r>
+            <a:r>
+              <a:rPr lang="en-US" smtClean="0"/>
+              <a:t>the same as the previous slide.</a:t>
+            </a:r>
+            <a:endParaRPr lang="en-US"/>
+          </a:p>
+        </p:txBody>
+      </p:sp>
     </p:spTree>
     <p:extLst>
       <p:ext uri="{BB962C8B-B14F-4D97-AF65-F5344CB8AC3E}">

</xml_diff>